<commit_message>
M0090IDE-4009 Update screenshot of Application classpath
</commit_message>
<xml_diff>
--- a/ApplicationDeveloperGuide/images/ClassPath_4.pptx
+++ b/ApplicationDeveloperGuide/images/ClassPath_4.pptx
@@ -261,7 +261,7 @@
           <a:p>
             <a:fld id="{C5666379-CC11-43F5-BADF-C40A8248B8AD}" type="datetimeFigureOut">
               <a:rPr lang="en-GB" smtClean="0"/>
-              <a:t>27/02/2020</a:t>
+              <a:t>04/11/2022</a:t>
             </a:fld>
             <a:endParaRPr lang="en-GB"/>
           </a:p>
@@ -461,7 +461,7 @@
           <a:p>
             <a:fld id="{C5666379-CC11-43F5-BADF-C40A8248B8AD}" type="datetimeFigureOut">
               <a:rPr lang="en-GB" smtClean="0"/>
-              <a:t>27/02/2020</a:t>
+              <a:t>04/11/2022</a:t>
             </a:fld>
             <a:endParaRPr lang="en-GB"/>
           </a:p>
@@ -671,7 +671,7 @@
           <a:p>
             <a:fld id="{C5666379-CC11-43F5-BADF-C40A8248B8AD}" type="datetimeFigureOut">
               <a:rPr lang="en-GB" smtClean="0"/>
-              <a:t>27/02/2020</a:t>
+              <a:t>04/11/2022</a:t>
             </a:fld>
             <a:endParaRPr lang="en-GB"/>
           </a:p>
@@ -871,7 +871,7 @@
           <a:p>
             <a:fld id="{C5666379-CC11-43F5-BADF-C40A8248B8AD}" type="datetimeFigureOut">
               <a:rPr lang="en-GB" smtClean="0"/>
-              <a:t>27/02/2020</a:t>
+              <a:t>04/11/2022</a:t>
             </a:fld>
             <a:endParaRPr lang="en-GB"/>
           </a:p>
@@ -1147,7 +1147,7 @@
           <a:p>
             <a:fld id="{C5666379-CC11-43F5-BADF-C40A8248B8AD}" type="datetimeFigureOut">
               <a:rPr lang="en-GB" smtClean="0"/>
-              <a:t>27/02/2020</a:t>
+              <a:t>04/11/2022</a:t>
             </a:fld>
             <a:endParaRPr lang="en-GB"/>
           </a:p>
@@ -1415,7 +1415,7 @@
           <a:p>
             <a:fld id="{C5666379-CC11-43F5-BADF-C40A8248B8AD}" type="datetimeFigureOut">
               <a:rPr lang="en-GB" smtClean="0"/>
-              <a:t>27/02/2020</a:t>
+              <a:t>04/11/2022</a:t>
             </a:fld>
             <a:endParaRPr lang="en-GB"/>
           </a:p>
@@ -1830,7 +1830,7 @@
           <a:p>
             <a:fld id="{C5666379-CC11-43F5-BADF-C40A8248B8AD}" type="datetimeFigureOut">
               <a:rPr lang="en-GB" smtClean="0"/>
-              <a:t>27/02/2020</a:t>
+              <a:t>04/11/2022</a:t>
             </a:fld>
             <a:endParaRPr lang="en-GB"/>
           </a:p>
@@ -1972,7 +1972,7 @@
           <a:p>
             <a:fld id="{C5666379-CC11-43F5-BADF-C40A8248B8AD}" type="datetimeFigureOut">
               <a:rPr lang="en-GB" smtClean="0"/>
-              <a:t>27/02/2020</a:t>
+              <a:t>04/11/2022</a:t>
             </a:fld>
             <a:endParaRPr lang="en-GB"/>
           </a:p>
@@ -2085,7 +2085,7 @@
           <a:p>
             <a:fld id="{C5666379-CC11-43F5-BADF-C40A8248B8AD}" type="datetimeFigureOut">
               <a:rPr lang="en-GB" smtClean="0"/>
-              <a:t>27/02/2020</a:t>
+              <a:t>04/11/2022</a:t>
             </a:fld>
             <a:endParaRPr lang="en-GB"/>
           </a:p>
@@ -2398,7 +2398,7 @@
           <a:p>
             <a:fld id="{C5666379-CC11-43F5-BADF-C40A8248B8AD}" type="datetimeFigureOut">
               <a:rPr lang="en-GB" smtClean="0"/>
-              <a:t>27/02/2020</a:t>
+              <a:t>04/11/2022</a:t>
             </a:fld>
             <a:endParaRPr lang="en-GB"/>
           </a:p>
@@ -2687,7 +2687,7 @@
           <a:p>
             <a:fld id="{C5666379-CC11-43F5-BADF-C40A8248B8AD}" type="datetimeFigureOut">
               <a:rPr lang="en-GB" smtClean="0"/>
-              <a:t>27/02/2020</a:t>
+              <a:t>04/11/2022</a:t>
             </a:fld>
             <a:endParaRPr lang="en-GB"/>
           </a:p>
@@ -2930,7 +2930,7 @@
           <a:p>
             <a:fld id="{C5666379-CC11-43F5-BADF-C40A8248B8AD}" type="datetimeFigureOut">
               <a:rPr lang="en-GB" smtClean="0"/>
-              <a:t>27/02/2020</a:t>
+              <a:t>04/11/2022</a:t>
             </a:fld>
             <a:endParaRPr lang="en-GB"/>
           </a:p>
@@ -3349,10 +3349,10 @@
       </p:grpSpPr>
       <p:pic>
         <p:nvPicPr>
-          <p:cNvPr id="4" name="Picture 3">
-            <a:extLst>
-              <a:ext uri="{FF2B5EF4-FFF2-40B4-BE49-F238E27FC236}">
-                <a16:creationId xmlns:a16="http://schemas.microsoft.com/office/drawing/2014/main" id="{D84CE408-8B07-4B40-90CA-0462F31557BC}"/>
+          <p:cNvPr id="7" name="Picture 6">
+            <a:extLst>
+              <a:ext uri="{FF2B5EF4-FFF2-40B4-BE49-F238E27FC236}">
+                <a16:creationId xmlns:a16="http://schemas.microsoft.com/office/drawing/2014/main" id="{A2FBE8B2-D5FD-EEF0-F027-39D98213C5AD}"/>
               </a:ext>
             </a:extLst>
           </p:cNvPr>
@@ -3361,15 +3361,16 @@
           </p:cNvPicPr>
           <p:nvPr/>
         </p:nvPicPr>
-        <p:blipFill rotWithShape="1">
+        <p:blipFill>
           <a:blip r:embed="rId2"/>
-          <a:srcRect r="5282" b="4868"/>
-          <a:stretch/>
+          <a:stretch>
+            <a:fillRect/>
+          </a:stretch>
         </p:blipFill>
         <p:spPr>
           <a:xfrm>
-            <a:off x="1081041" y="433388"/>
-            <a:ext cx="7397941" cy="5699558"/>
+            <a:off x="546507" y="258620"/>
+            <a:ext cx="5125165" cy="5696745"/>
           </a:xfrm>
           <a:prstGeom prst="rect">
             <a:avLst/>
@@ -3390,8 +3391,8 @@
         </p:nvSpPr>
         <p:spPr>
           <a:xfrm>
-            <a:off x="2560320" y="3619500"/>
-            <a:ext cx="822960" cy="857250"/>
+            <a:off x="2143431" y="3648997"/>
+            <a:ext cx="737879" cy="667364"/>
           </a:xfrm>
           <a:prstGeom prst="rightBracket">
             <a:avLst>
@@ -3441,7 +3442,7 @@
         </p:nvSpPr>
         <p:spPr>
           <a:xfrm>
-            <a:off x="3609975" y="3429000"/>
+            <a:off x="3226071" y="3419332"/>
             <a:ext cx="219076" cy="289727"/>
           </a:xfrm>
           <a:prstGeom prst="rightBrace">
@@ -3495,8 +3496,8 @@
         </p:nvSpPr>
         <p:spPr>
           <a:xfrm>
-            <a:off x="5562599" y="1152525"/>
-            <a:ext cx="238125" cy="2217436"/>
+            <a:off x="5562599" y="1435509"/>
+            <a:ext cx="238125" cy="1858297"/>
           </a:xfrm>
           <a:prstGeom prst="rightBrace">
             <a:avLst/>
@@ -3549,8 +3550,8 @@
         </p:nvSpPr>
         <p:spPr>
           <a:xfrm>
-            <a:off x="2881311" y="638175"/>
-            <a:ext cx="219076" cy="289727"/>
+            <a:off x="2881311" y="520099"/>
+            <a:ext cx="219076" cy="758096"/>
           </a:xfrm>
           <a:prstGeom prst="rightBrace">
             <a:avLst/>
@@ -3603,7 +3604,7 @@
         </p:nvSpPr>
         <p:spPr>
           <a:xfrm>
-            <a:off x="5800724" y="1902680"/>
+            <a:off x="5863624" y="2016948"/>
             <a:ext cx="1369696" cy="709490"/>
           </a:xfrm>
           <a:prstGeom prst="rect">
@@ -3650,7 +3651,7 @@
         </p:nvSpPr>
         <p:spPr>
           <a:xfrm>
-            <a:off x="3100387" y="589054"/>
+            <a:off x="3100386" y="716082"/>
             <a:ext cx="2945177" cy="407804"/>
           </a:xfrm>
           <a:prstGeom prst="rect">
@@ -3719,7 +3720,7 @@
         </p:nvSpPr>
         <p:spPr>
           <a:xfrm>
-            <a:off x="3830955" y="3369961"/>
+            <a:off x="3447051" y="3360293"/>
             <a:ext cx="4116705" cy="407804"/>
           </a:xfrm>
           <a:prstGeom prst="rect">

</xml_diff>